<commit_message>
Added all figures and organized them
</commit_message>
<xml_diff>
--- a/ABMdev/ABM_UML_diagrams.pptx
+++ b/ABMdev/ABM_UML_diagrams.pptx
@@ -6,6 +6,7 @@
   </p:sldMasterIdLst>
   <p:sldIdLst>
     <p:sldId id="256" r:id="rId2"/>
+    <p:sldId id="257" r:id="rId3"/>
   </p:sldIdLst>
   <p:sldSz cx="9144000" cy="6858000" type="screen4x3"/>
   <p:notesSz cx="6858000" cy="9144000"/>
@@ -104,6 +105,11 @@
       </a:defRPr>
     </a:lvl9pPr>
   </p:defaultTextStyle>
+  <p:extLst>
+    <p:ext uri="{EFAFB233-063F-42B5-8137-9DF3F51BA10A}">
+      <p15:sldGuideLst xmlns:p15="http://schemas.microsoft.com/office/powerpoint/2012/main"/>
+    </p:ext>
+  </p:extLst>
 </p:presentation>
 </file>
 
@@ -238,7 +244,7 @@
           <a:p>
             <a:fld id="{6447A873-F697-6C41-9F13-3470E9875F84}" type="datetimeFigureOut">
               <a:rPr lang="en-US" smtClean="0"/>
-              <a:t>5/20/19</a:t>
+              <a:t>5/30/19</a:t>
             </a:fld>
             <a:endParaRPr lang="en-US"/>
           </a:p>
@@ -408,7 +414,7 @@
           <a:p>
             <a:fld id="{6447A873-F697-6C41-9F13-3470E9875F84}" type="datetimeFigureOut">
               <a:rPr lang="en-US" smtClean="0"/>
-              <a:t>5/20/19</a:t>
+              <a:t>5/30/19</a:t>
             </a:fld>
             <a:endParaRPr lang="en-US"/>
           </a:p>
@@ -588,7 +594,7 @@
           <a:p>
             <a:fld id="{6447A873-F697-6C41-9F13-3470E9875F84}" type="datetimeFigureOut">
               <a:rPr lang="en-US" smtClean="0"/>
-              <a:t>5/20/19</a:t>
+              <a:t>5/30/19</a:t>
             </a:fld>
             <a:endParaRPr lang="en-US"/>
           </a:p>
@@ -758,7 +764,7 @@
           <a:p>
             <a:fld id="{6447A873-F697-6C41-9F13-3470E9875F84}" type="datetimeFigureOut">
               <a:rPr lang="en-US" smtClean="0"/>
-              <a:t>5/20/19</a:t>
+              <a:t>5/30/19</a:t>
             </a:fld>
             <a:endParaRPr lang="en-US"/>
           </a:p>
@@ -1002,7 +1008,7 @@
           <a:p>
             <a:fld id="{6447A873-F697-6C41-9F13-3470E9875F84}" type="datetimeFigureOut">
               <a:rPr lang="en-US" smtClean="0"/>
-              <a:t>5/20/19</a:t>
+              <a:t>5/30/19</a:t>
             </a:fld>
             <a:endParaRPr lang="en-US"/>
           </a:p>
@@ -1234,7 +1240,7 @@
           <a:p>
             <a:fld id="{6447A873-F697-6C41-9F13-3470E9875F84}" type="datetimeFigureOut">
               <a:rPr lang="en-US" smtClean="0"/>
-              <a:t>5/20/19</a:t>
+              <a:t>5/30/19</a:t>
             </a:fld>
             <a:endParaRPr lang="en-US"/>
           </a:p>
@@ -1601,7 +1607,7 @@
           <a:p>
             <a:fld id="{6447A873-F697-6C41-9F13-3470E9875F84}" type="datetimeFigureOut">
               <a:rPr lang="en-US" smtClean="0"/>
-              <a:t>5/20/19</a:t>
+              <a:t>5/30/19</a:t>
             </a:fld>
             <a:endParaRPr lang="en-US"/>
           </a:p>
@@ -1719,7 +1725,7 @@
           <a:p>
             <a:fld id="{6447A873-F697-6C41-9F13-3470E9875F84}" type="datetimeFigureOut">
               <a:rPr lang="en-US" smtClean="0"/>
-              <a:t>5/20/19</a:t>
+              <a:t>5/30/19</a:t>
             </a:fld>
             <a:endParaRPr lang="en-US"/>
           </a:p>
@@ -1814,7 +1820,7 @@
           <a:p>
             <a:fld id="{6447A873-F697-6C41-9F13-3470E9875F84}" type="datetimeFigureOut">
               <a:rPr lang="en-US" smtClean="0"/>
-              <a:t>5/20/19</a:t>
+              <a:t>5/30/19</a:t>
             </a:fld>
             <a:endParaRPr lang="en-US"/>
           </a:p>
@@ -2091,7 +2097,7 @@
           <a:p>
             <a:fld id="{6447A873-F697-6C41-9F13-3470E9875F84}" type="datetimeFigureOut">
               <a:rPr lang="en-US" smtClean="0"/>
-              <a:t>5/20/19</a:t>
+              <a:t>5/30/19</a:t>
             </a:fld>
             <a:endParaRPr lang="en-US"/>
           </a:p>
@@ -2348,7 +2354,7 @@
           <a:p>
             <a:fld id="{6447A873-F697-6C41-9F13-3470E9875F84}" type="datetimeFigureOut">
               <a:rPr lang="en-US" smtClean="0"/>
-              <a:t>5/20/19</a:t>
+              <a:t>5/30/19</a:t>
             </a:fld>
             <a:endParaRPr lang="en-US"/>
           </a:p>
@@ -2561,7 +2567,7 @@
           <a:p>
             <a:fld id="{6447A873-F697-6C41-9F13-3470E9875F84}" type="datetimeFigureOut">
               <a:rPr lang="en-US" smtClean="0"/>
-              <a:t>5/20/19</a:t>
+              <a:t>5/30/19</a:t>
             </a:fld>
             <a:endParaRPr lang="en-US"/>
           </a:p>
@@ -3433,6 +3439,400 @@
 </p:sld>
 </file>
 
+<file path=ppt/slides/slide2.xml><?xml version="1.0" encoding="utf-8"?>
+<p:sld xmlns:a="http://schemas.openxmlformats.org/drawingml/2006/main" xmlns:r="http://schemas.openxmlformats.org/officeDocument/2006/relationships" xmlns:p="http://schemas.openxmlformats.org/presentationml/2006/main">
+  <p:cSld>
+    <p:spTree>
+      <p:nvGrpSpPr>
+        <p:cNvPr id="1" name=""/>
+        <p:cNvGrpSpPr/>
+        <p:nvPr/>
+      </p:nvGrpSpPr>
+      <p:grpSpPr>
+        <a:xfrm>
+          <a:off x="0" y="0"/>
+          <a:ext cx="0" cy="0"/>
+          <a:chOff x="0" y="0"/>
+          <a:chExt cx="0" cy="0"/>
+        </a:xfrm>
+      </p:grpSpPr>
+      <p:sp>
+        <p:nvSpPr>
+          <p:cNvPr id="2" name="Rectangle 1">
+            <a:extLst>
+              <a:ext uri="{FF2B5EF4-FFF2-40B4-BE49-F238E27FC236}">
+                <a16:creationId xmlns:a16="http://schemas.microsoft.com/office/drawing/2014/main" id="{3CB5526B-1151-C147-B7E2-CC66BBABC761}"/>
+              </a:ext>
+            </a:extLst>
+          </p:cNvPr>
+          <p:cNvSpPr/>
+          <p:nvPr/>
+        </p:nvSpPr>
+        <p:spPr>
+          <a:xfrm>
+            <a:off x="685800" y="500743"/>
+            <a:ext cx="1905000" cy="816428"/>
+          </a:xfrm>
+          <a:prstGeom prst="rect">
+            <a:avLst/>
+          </a:prstGeom>
+        </p:spPr>
+        <p:style>
+          <a:lnRef idx="2">
+            <a:schemeClr val="accent1">
+              <a:shade val="50000"/>
+            </a:schemeClr>
+          </a:lnRef>
+          <a:fillRef idx="1">
+            <a:schemeClr val="accent1"/>
+          </a:fillRef>
+          <a:effectRef idx="0">
+            <a:schemeClr val="accent1"/>
+          </a:effectRef>
+          <a:fontRef idx="minor">
+            <a:schemeClr val="lt1"/>
+          </a:fontRef>
+        </p:style>
+        <p:txBody>
+          <a:bodyPr rtlCol="0" anchor="ctr"/>
+          <a:lstStyle/>
+          <a:p>
+            <a:pPr algn="ctr"/>
+            <a:r>
+              <a:rPr lang="en-US" dirty="0"/>
+              <a:t>Setup Landscape</a:t>
+            </a:r>
+          </a:p>
+        </p:txBody>
+      </p:sp>
+      <p:sp>
+        <p:nvSpPr>
+          <p:cNvPr id="3" name="Rectangle 2">
+            <a:extLst>
+              <a:ext uri="{FF2B5EF4-FFF2-40B4-BE49-F238E27FC236}">
+                <a16:creationId xmlns:a16="http://schemas.microsoft.com/office/drawing/2014/main" id="{FED5F1BF-AE81-8A43-9855-9C0E32630C7C}"/>
+              </a:ext>
+            </a:extLst>
+          </p:cNvPr>
+          <p:cNvSpPr/>
+          <p:nvPr/>
+        </p:nvSpPr>
+        <p:spPr>
+          <a:xfrm>
+            <a:off x="685800" y="1480456"/>
+            <a:ext cx="1905000" cy="2329543"/>
+          </a:xfrm>
+          <a:prstGeom prst="rect">
+            <a:avLst/>
+          </a:prstGeom>
+        </p:spPr>
+        <p:style>
+          <a:lnRef idx="2">
+            <a:schemeClr val="accent1"/>
+          </a:lnRef>
+          <a:fillRef idx="1">
+            <a:schemeClr val="lt1"/>
+          </a:fillRef>
+          <a:effectRef idx="0">
+            <a:schemeClr val="accent1"/>
+          </a:effectRef>
+          <a:fontRef idx="minor">
+            <a:schemeClr val="dk1"/>
+          </a:fontRef>
+        </p:style>
+        <p:txBody>
+          <a:bodyPr rtlCol="0" anchor="t"/>
+          <a:lstStyle/>
+          <a:p>
+            <a:pPr algn="ctr"/>
+            <a:r>
+              <a:rPr lang="en-US" dirty="0"/>
+              <a:t>Static Land Characteristics</a:t>
+            </a:r>
+          </a:p>
+          <a:p>
+            <a:pPr algn="ctr"/>
+            <a:endParaRPr lang="en-US" dirty="0"/>
+          </a:p>
+          <a:p>
+            <a:r>
+              <a:rPr lang="en-US" dirty="0"/>
+              <a:t>-elevation, soils, slope, aspect, extent</a:t>
+            </a:r>
+          </a:p>
+        </p:txBody>
+      </p:sp>
+      <p:sp>
+        <p:nvSpPr>
+          <p:cNvPr id="4" name="Rectangle 3">
+            <a:extLst>
+              <a:ext uri="{FF2B5EF4-FFF2-40B4-BE49-F238E27FC236}">
+                <a16:creationId xmlns:a16="http://schemas.microsoft.com/office/drawing/2014/main" id="{3ED66CAF-8A48-9B41-8AFB-701F13FCDF97}"/>
+              </a:ext>
+            </a:extLst>
+          </p:cNvPr>
+          <p:cNvSpPr/>
+          <p:nvPr/>
+        </p:nvSpPr>
+        <p:spPr>
+          <a:xfrm>
+            <a:off x="3156858" y="2775856"/>
+            <a:ext cx="1905000" cy="816428"/>
+          </a:xfrm>
+          <a:prstGeom prst="rect">
+            <a:avLst/>
+          </a:prstGeom>
+        </p:spPr>
+        <p:style>
+          <a:lnRef idx="2">
+            <a:schemeClr val="accent1">
+              <a:shade val="50000"/>
+            </a:schemeClr>
+          </a:lnRef>
+          <a:fillRef idx="1">
+            <a:schemeClr val="accent1"/>
+          </a:fillRef>
+          <a:effectRef idx="0">
+            <a:schemeClr val="accent1"/>
+          </a:effectRef>
+          <a:fontRef idx="minor">
+            <a:schemeClr val="lt1"/>
+          </a:fontRef>
+        </p:style>
+        <p:txBody>
+          <a:bodyPr rtlCol="0" anchor="ctr"/>
+          <a:lstStyle/>
+          <a:p>
+            <a:pPr algn="ctr"/>
+            <a:r>
+              <a:rPr lang="en-US" dirty="0"/>
+              <a:t>Populate Landscape w Agents</a:t>
+            </a:r>
+          </a:p>
+        </p:txBody>
+      </p:sp>
+      <p:sp>
+        <p:nvSpPr>
+          <p:cNvPr id="5" name="Rectangle 4">
+            <a:extLst>
+              <a:ext uri="{FF2B5EF4-FFF2-40B4-BE49-F238E27FC236}">
+                <a16:creationId xmlns:a16="http://schemas.microsoft.com/office/drawing/2014/main" id="{2E834B05-D011-B447-A039-118099E53D20}"/>
+              </a:ext>
+            </a:extLst>
+          </p:cNvPr>
+          <p:cNvSpPr/>
+          <p:nvPr/>
+        </p:nvSpPr>
+        <p:spPr>
+          <a:xfrm>
+            <a:off x="3156858" y="500743"/>
+            <a:ext cx="1905000" cy="631371"/>
+          </a:xfrm>
+          <a:prstGeom prst="rect">
+            <a:avLst/>
+          </a:prstGeom>
+        </p:spPr>
+        <p:style>
+          <a:lnRef idx="2">
+            <a:schemeClr val="accent1"/>
+          </a:lnRef>
+          <a:fillRef idx="1">
+            <a:schemeClr val="lt1"/>
+          </a:fillRef>
+          <a:effectRef idx="0">
+            <a:schemeClr val="accent1"/>
+          </a:effectRef>
+          <a:fontRef idx="minor">
+            <a:schemeClr val="dk1"/>
+          </a:fontRef>
+        </p:style>
+        <p:txBody>
+          <a:bodyPr rtlCol="0" anchor="t"/>
+          <a:lstStyle/>
+          <a:p>
+            <a:r>
+              <a:rPr lang="en-US" dirty="0"/>
+              <a:t>-Land cover</a:t>
+            </a:r>
+          </a:p>
+          <a:p>
+            <a:r>
+              <a:rPr lang="en-US" dirty="0"/>
+              <a:t>-Distance to Cities</a:t>
+            </a:r>
+          </a:p>
+        </p:txBody>
+      </p:sp>
+      <p:sp>
+        <p:nvSpPr>
+          <p:cNvPr id="6" name="Rectangle 5">
+            <a:extLst>
+              <a:ext uri="{FF2B5EF4-FFF2-40B4-BE49-F238E27FC236}">
+                <a16:creationId xmlns:a16="http://schemas.microsoft.com/office/drawing/2014/main" id="{A0FD8411-D9B5-2040-8FDA-4F5C1314C834}"/>
+              </a:ext>
+            </a:extLst>
+          </p:cNvPr>
+          <p:cNvSpPr/>
+          <p:nvPr/>
+        </p:nvSpPr>
+        <p:spPr>
+          <a:xfrm>
+            <a:off x="3156858" y="1480456"/>
+            <a:ext cx="1905000" cy="947058"/>
+          </a:xfrm>
+          <a:prstGeom prst="rect">
+            <a:avLst/>
+          </a:prstGeom>
+        </p:spPr>
+        <p:style>
+          <a:lnRef idx="2">
+            <a:schemeClr val="accent1"/>
+          </a:lnRef>
+          <a:fillRef idx="1">
+            <a:schemeClr val="lt1"/>
+          </a:fillRef>
+          <a:effectRef idx="0">
+            <a:schemeClr val="accent1"/>
+          </a:effectRef>
+          <a:fontRef idx="minor">
+            <a:schemeClr val="dk1"/>
+          </a:fontRef>
+        </p:style>
+        <p:txBody>
+          <a:bodyPr rtlCol="0" anchor="t"/>
+          <a:lstStyle/>
+          <a:p>
+            <a:r>
+              <a:rPr lang="en-US" dirty="0"/>
+              <a:t>Translate land cover to agent type</a:t>
+            </a:r>
+          </a:p>
+        </p:txBody>
+      </p:sp>
+      <p:sp>
+        <p:nvSpPr>
+          <p:cNvPr id="7" name="Rectangle 6">
+            <a:extLst>
+              <a:ext uri="{FF2B5EF4-FFF2-40B4-BE49-F238E27FC236}">
+                <a16:creationId xmlns:a16="http://schemas.microsoft.com/office/drawing/2014/main" id="{29419368-A691-8644-884E-98C43A9F7340}"/>
+              </a:ext>
+            </a:extLst>
+          </p:cNvPr>
+          <p:cNvSpPr/>
+          <p:nvPr/>
+        </p:nvSpPr>
+        <p:spPr>
+          <a:xfrm>
+            <a:off x="5627916" y="500743"/>
+            <a:ext cx="1905000" cy="816428"/>
+          </a:xfrm>
+          <a:prstGeom prst="rect">
+            <a:avLst/>
+          </a:prstGeom>
+        </p:spPr>
+        <p:style>
+          <a:lnRef idx="2">
+            <a:schemeClr val="accent1">
+              <a:shade val="50000"/>
+            </a:schemeClr>
+          </a:lnRef>
+          <a:fillRef idx="1">
+            <a:schemeClr val="accent1"/>
+          </a:fillRef>
+          <a:effectRef idx="0">
+            <a:schemeClr val="accent1"/>
+          </a:effectRef>
+          <a:fontRef idx="minor">
+            <a:schemeClr val="lt1"/>
+          </a:fontRef>
+        </p:style>
+        <p:txBody>
+          <a:bodyPr rtlCol="0" anchor="ctr"/>
+          <a:lstStyle/>
+          <a:p>
+            <a:pPr algn="ctr"/>
+            <a:r>
+              <a:rPr lang="en-US" dirty="0"/>
+              <a:t>Run Model</a:t>
+            </a:r>
+          </a:p>
+        </p:txBody>
+      </p:sp>
+      <p:sp>
+        <p:nvSpPr>
+          <p:cNvPr id="8" name="Rectangle 7">
+            <a:extLst>
+              <a:ext uri="{FF2B5EF4-FFF2-40B4-BE49-F238E27FC236}">
+                <a16:creationId xmlns:a16="http://schemas.microsoft.com/office/drawing/2014/main" id="{65D5BC36-FE0C-8C41-9421-3EB8F5E75E31}"/>
+              </a:ext>
+            </a:extLst>
+          </p:cNvPr>
+          <p:cNvSpPr/>
+          <p:nvPr/>
+        </p:nvSpPr>
+        <p:spPr>
+          <a:xfrm>
+            <a:off x="5627916" y="1480456"/>
+            <a:ext cx="1905000" cy="947058"/>
+          </a:xfrm>
+          <a:prstGeom prst="rect">
+            <a:avLst/>
+          </a:prstGeom>
+        </p:spPr>
+        <p:style>
+          <a:lnRef idx="2">
+            <a:schemeClr val="accent1"/>
+          </a:lnRef>
+          <a:fillRef idx="1">
+            <a:schemeClr val="lt1"/>
+          </a:fillRef>
+          <a:effectRef idx="0">
+            <a:schemeClr val="accent1"/>
+          </a:effectRef>
+          <a:fontRef idx="minor">
+            <a:schemeClr val="dk1"/>
+          </a:fontRef>
+        </p:style>
+        <p:txBody>
+          <a:bodyPr rtlCol="0" anchor="t"/>
+          <a:lstStyle/>
+          <a:p>
+            <a:r>
+              <a:rPr lang="en-US" dirty="0"/>
+              <a:t>Initialize t</a:t>
+            </a:r>
+            <a:r>
+              <a:rPr lang="en-US" baseline="-25000" dirty="0"/>
+              <a:t>1</a:t>
+            </a:r>
+          </a:p>
+          <a:p>
+            <a:r>
+              <a:rPr lang="en-US" dirty="0"/>
+              <a:t>Define rules</a:t>
+            </a:r>
+          </a:p>
+          <a:p>
+            <a:r>
+              <a:rPr lang="en-US" dirty="0"/>
+              <a:t>Update land cover</a:t>
+            </a:r>
+          </a:p>
+        </p:txBody>
+      </p:sp>
+    </p:spTree>
+    <p:extLst>
+      <p:ext uri="{BB962C8B-B14F-4D97-AF65-F5344CB8AC3E}">
+        <p14:creationId xmlns:p14="http://schemas.microsoft.com/office/powerpoint/2010/main" val="3093053282"/>
+      </p:ext>
+    </p:extLst>
+  </p:cSld>
+  <p:clrMapOvr>
+    <a:masterClrMapping/>
+  </p:clrMapOvr>
+</p:sld>
+</file>
+
 <file path=ppt/theme/theme1.xml><?xml version="1.0" encoding="utf-8"?>
 <a:theme xmlns:a="http://schemas.openxmlformats.org/drawingml/2006/main" name="Office Theme">
   <a:themeElements>

</xml_diff>